<commit_message>
fixed event loop architecture in manual
</commit_message>
<xml_diff>
--- a/docs/kalasim_concepts.pptx
+++ b/docs/kalasim_concepts.pptx
@@ -262,7 +262,7 @@
           <a:p>
             <a:fld id="{1BFFCDDA-1F42-48E8-80CE-21DA24509F0D}" type="datetimeFigureOut">
               <a:rPr lang="en-US" smtClean="0"/>
-              <a:t>12/12/2020</a:t>
+              <a:t>11/1/2021</a:t>
             </a:fld>
             <a:endParaRPr lang="en-US"/>
           </a:p>
@@ -462,7 +462,7 @@
           <a:p>
             <a:fld id="{1BFFCDDA-1F42-48E8-80CE-21DA24509F0D}" type="datetimeFigureOut">
               <a:rPr lang="en-US" smtClean="0"/>
-              <a:t>12/12/2020</a:t>
+              <a:t>11/1/2021</a:t>
             </a:fld>
             <a:endParaRPr lang="en-US"/>
           </a:p>
@@ -672,7 +672,7 @@
           <a:p>
             <a:fld id="{1BFFCDDA-1F42-48E8-80CE-21DA24509F0D}" type="datetimeFigureOut">
               <a:rPr lang="en-US" smtClean="0"/>
-              <a:t>12/12/2020</a:t>
+              <a:t>11/1/2021</a:t>
             </a:fld>
             <a:endParaRPr lang="en-US"/>
           </a:p>
@@ -872,7 +872,7 @@
           <a:p>
             <a:fld id="{1BFFCDDA-1F42-48E8-80CE-21DA24509F0D}" type="datetimeFigureOut">
               <a:rPr lang="en-US" smtClean="0"/>
-              <a:t>12/12/2020</a:t>
+              <a:t>11/1/2021</a:t>
             </a:fld>
             <a:endParaRPr lang="en-US"/>
           </a:p>
@@ -1148,7 +1148,7 @@
           <a:p>
             <a:fld id="{1BFFCDDA-1F42-48E8-80CE-21DA24509F0D}" type="datetimeFigureOut">
               <a:rPr lang="en-US" smtClean="0"/>
-              <a:t>12/12/2020</a:t>
+              <a:t>11/1/2021</a:t>
             </a:fld>
             <a:endParaRPr lang="en-US"/>
           </a:p>
@@ -1416,7 +1416,7 @@
           <a:p>
             <a:fld id="{1BFFCDDA-1F42-48E8-80CE-21DA24509F0D}" type="datetimeFigureOut">
               <a:rPr lang="en-US" smtClean="0"/>
-              <a:t>12/12/2020</a:t>
+              <a:t>11/1/2021</a:t>
             </a:fld>
             <a:endParaRPr lang="en-US"/>
           </a:p>
@@ -1831,7 +1831,7 @@
           <a:p>
             <a:fld id="{1BFFCDDA-1F42-48E8-80CE-21DA24509F0D}" type="datetimeFigureOut">
               <a:rPr lang="en-US" smtClean="0"/>
-              <a:t>12/12/2020</a:t>
+              <a:t>11/1/2021</a:t>
             </a:fld>
             <a:endParaRPr lang="en-US"/>
           </a:p>
@@ -1973,7 +1973,7 @@
           <a:p>
             <a:fld id="{1BFFCDDA-1F42-48E8-80CE-21DA24509F0D}" type="datetimeFigureOut">
               <a:rPr lang="en-US" smtClean="0"/>
-              <a:t>12/12/2020</a:t>
+              <a:t>11/1/2021</a:t>
             </a:fld>
             <a:endParaRPr lang="en-US"/>
           </a:p>
@@ -2086,7 +2086,7 @@
           <a:p>
             <a:fld id="{1BFFCDDA-1F42-48E8-80CE-21DA24509F0D}" type="datetimeFigureOut">
               <a:rPr lang="en-US" smtClean="0"/>
-              <a:t>12/12/2020</a:t>
+              <a:t>11/1/2021</a:t>
             </a:fld>
             <a:endParaRPr lang="en-US"/>
           </a:p>
@@ -2399,7 +2399,7 @@
           <a:p>
             <a:fld id="{1BFFCDDA-1F42-48E8-80CE-21DA24509F0D}" type="datetimeFigureOut">
               <a:rPr lang="en-US" smtClean="0"/>
-              <a:t>12/12/2020</a:t>
+              <a:t>11/1/2021</a:t>
             </a:fld>
             <a:endParaRPr lang="en-US"/>
           </a:p>
@@ -2688,7 +2688,7 @@
           <a:p>
             <a:fld id="{1BFFCDDA-1F42-48E8-80CE-21DA24509F0D}" type="datetimeFigureOut">
               <a:rPr lang="en-US" smtClean="0"/>
-              <a:t>12/12/2020</a:t>
+              <a:t>11/1/2021</a:t>
             </a:fld>
             <a:endParaRPr lang="en-US"/>
           </a:p>
@@ -2931,7 +2931,7 @@
           <a:p>
             <a:fld id="{1BFFCDDA-1F42-48E8-80CE-21DA24509F0D}" type="datetimeFigureOut">
               <a:rPr lang="en-US" smtClean="0"/>
-              <a:t>12/12/2020</a:t>
+              <a:t>11/1/2021</a:t>
             </a:fld>
             <a:endParaRPr lang="en-US"/>
           </a:p>
@@ -3433,10 +3433,10 @@
       </p:grpSpPr>
       <p:pic>
         <p:nvPicPr>
-          <p:cNvPr id="5" name="Grafik 4">
-            <a:extLst>
-              <a:ext uri="{FF2B5EF4-FFF2-40B4-BE49-F238E27FC236}">
-                <a16:creationId xmlns:a16="http://schemas.microsoft.com/office/drawing/2014/main" id="{3CF74BC0-0E4F-4395-9980-2E851F0DCD6A}"/>
+          <p:cNvPr id="3" name="Grafik 2">
+            <a:extLst>
+              <a:ext uri="{FF2B5EF4-FFF2-40B4-BE49-F238E27FC236}">
+                <a16:creationId xmlns:a16="http://schemas.microsoft.com/office/drawing/2014/main" id="{CF733478-2858-4D5A-A6EF-52DE70314C09}"/>
               </a:ext>
             </a:extLst>
           </p:cNvPr>
@@ -3453,8 +3453,8 @@
         </p:blipFill>
         <p:spPr>
           <a:xfrm>
-            <a:off x="244252" y="1563990"/>
-            <a:ext cx="6211167" cy="3286584"/>
+            <a:off x="238535" y="1320984"/>
+            <a:ext cx="5661124" cy="3286584"/>
           </a:xfrm>
           <a:prstGeom prst="rect">
             <a:avLst/>
@@ -3475,7 +3475,7 @@
         </p:nvSpPr>
         <p:spPr>
           <a:xfrm>
-            <a:off x="7526214" y="589085"/>
+            <a:off x="7617119" y="331910"/>
             <a:ext cx="4237893" cy="4404256"/>
           </a:xfrm>
           <a:prstGeom prst="roundRect">
@@ -3524,7 +3524,7 @@
         </p:nvSpPr>
         <p:spPr>
           <a:xfrm>
-            <a:off x="8119940" y="2437316"/>
+            <a:off x="8210845" y="2180141"/>
             <a:ext cx="3179884" cy="2321743"/>
           </a:xfrm>
           <a:prstGeom prst="roundRect">
@@ -3573,7 +3573,7 @@
         </p:nvSpPr>
         <p:spPr>
           <a:xfrm>
-            <a:off x="8478966" y="2888919"/>
+            <a:off x="8569871" y="2631744"/>
             <a:ext cx="2453829" cy="298941"/>
           </a:xfrm>
           <a:prstGeom prst="roundRect">
@@ -3622,7 +3622,7 @@
         </p:nvSpPr>
         <p:spPr>
           <a:xfrm>
-            <a:off x="8480300" y="3309128"/>
+            <a:off x="8571205" y="3051953"/>
             <a:ext cx="2453829" cy="298941"/>
           </a:xfrm>
           <a:prstGeom prst="roundRect">
@@ -3671,7 +3671,7 @@
         </p:nvSpPr>
         <p:spPr>
           <a:xfrm>
-            <a:off x="8482967" y="4149546"/>
+            <a:off x="8573872" y="3892371"/>
             <a:ext cx="2453829" cy="298941"/>
           </a:xfrm>
           <a:prstGeom prst="roundRect">
@@ -3722,8 +3722,8 @@
         </p:nvCxnSpPr>
         <p:spPr>
           <a:xfrm>
-            <a:off x="3820160" y="2681225"/>
-            <a:ext cx="2721317" cy="1073179"/>
+            <a:off x="3229521" y="2477925"/>
+            <a:ext cx="3402861" cy="1019304"/>
           </a:xfrm>
           <a:prstGeom prst="straightConnector1">
             <a:avLst/>
@@ -3761,7 +3761,7 @@
         </p:nvSpPr>
         <p:spPr>
           <a:xfrm>
-            <a:off x="827438" y="5503818"/>
+            <a:off x="918343" y="5246643"/>
             <a:ext cx="3409768" cy="1200329"/>
           </a:xfrm>
           <a:prstGeom prst="rect">
@@ -3806,7 +3806,7 @@
         </p:nvGrpSpPr>
         <p:grpSpPr>
           <a:xfrm>
-            <a:off x="8167569" y="1093881"/>
+            <a:off x="8258474" y="836706"/>
             <a:ext cx="2117043" cy="712260"/>
             <a:chOff x="9460523" y="980339"/>
             <a:chExt cx="2117043" cy="712260"/>
@@ -3915,7 +3915,7 @@
         </p:nvSpPr>
         <p:spPr>
           <a:xfrm>
-            <a:off x="5783041" y="2888919"/>
+            <a:off x="5873946" y="2631744"/>
             <a:ext cx="597704" cy="481068"/>
           </a:xfrm>
           <a:prstGeom prst="ellipse">
@@ -3962,7 +3962,7 @@
         </p:nvSpPr>
         <p:spPr>
           <a:xfrm>
-            <a:off x="178180" y="3265296"/>
+            <a:off x="3857634" y="2899051"/>
             <a:ext cx="597704" cy="481068"/>
           </a:xfrm>
           <a:prstGeom prst="ellipse">
@@ -4009,7 +4009,7 @@
         </p:nvSpPr>
         <p:spPr>
           <a:xfrm>
-            <a:off x="5166807" y="5503818"/>
+            <a:off x="5257712" y="5246643"/>
             <a:ext cx="2603101" cy="923330"/>
           </a:xfrm>
           <a:prstGeom prst="rect">
@@ -4050,7 +4050,7 @@
         </p:nvSpPr>
         <p:spPr>
           <a:xfrm>
-            <a:off x="8547039" y="5503818"/>
+            <a:off x="8637944" y="5246643"/>
             <a:ext cx="3410712" cy="1200329"/>
           </a:xfrm>
           <a:prstGeom prst="rect">
@@ -4095,7 +4095,7 @@
         </p:nvSpPr>
         <p:spPr>
           <a:xfrm>
-            <a:off x="155269" y="5703580"/>
+            <a:off x="246174" y="5446405"/>
             <a:ext cx="597704" cy="481068"/>
           </a:xfrm>
           <a:prstGeom prst="ellipse">
@@ -4142,7 +4142,7 @@
         </p:nvSpPr>
         <p:spPr>
           <a:xfrm>
-            <a:off x="4511994" y="5703580"/>
+            <a:off x="4602899" y="5446405"/>
             <a:ext cx="597704" cy="481068"/>
           </a:xfrm>
           <a:prstGeom prst="ellipse">
@@ -4189,7 +4189,7 @@
         </p:nvSpPr>
         <p:spPr>
           <a:xfrm>
-            <a:off x="7824062" y="5703580"/>
+            <a:off x="7914967" y="5446405"/>
             <a:ext cx="597704" cy="481068"/>
           </a:xfrm>
           <a:prstGeom prst="ellipse">
@@ -4236,7 +4236,7 @@
         </p:nvSpPr>
         <p:spPr>
           <a:xfrm>
-            <a:off x="5942512" y="3934793"/>
+            <a:off x="6033417" y="3677618"/>
             <a:ext cx="1614801" cy="369332"/>
           </a:xfrm>
           <a:prstGeom prst="rect">
@@ -4270,7 +4270,7 @@
         </p:nvSpPr>
         <p:spPr>
           <a:xfrm>
-            <a:off x="7820708" y="3735152"/>
+            <a:off x="7911613" y="3477977"/>
             <a:ext cx="2453829" cy="298941"/>
           </a:xfrm>
           <a:prstGeom prst="roundRect">
@@ -4319,7 +4319,7 @@
         </p:nvSpPr>
         <p:spPr>
           <a:xfrm>
-            <a:off x="8351392" y="1713151"/>
+            <a:off x="8442297" y="1455976"/>
             <a:ext cx="1731814" cy="721828"/>
           </a:xfrm>
           <a:prstGeom prst="upArrow">
@@ -4363,7 +4363,7 @@
         </p:nvSpPr>
         <p:spPr>
           <a:xfrm>
-            <a:off x="6656802" y="3735993"/>
+            <a:off x="6747707" y="3478818"/>
             <a:ext cx="1097964" cy="298941"/>
           </a:xfrm>
           <a:prstGeom prst="rightArrow">
@@ -4407,7 +4407,7 @@
         </p:nvSpPr>
         <p:spPr>
           <a:xfrm>
-            <a:off x="8927239" y="1838242"/>
+            <a:off x="9018144" y="1581067"/>
             <a:ext cx="597704" cy="481068"/>
           </a:xfrm>
           <a:prstGeom prst="ellipse">
@@ -4454,7 +4454,7 @@
         </p:nvSpPr>
         <p:spPr>
           <a:xfrm>
-            <a:off x="10477330" y="1538763"/>
+            <a:off x="10568235" y="1281588"/>
             <a:ext cx="938270" cy="369332"/>
           </a:xfrm>
           <a:prstGeom prst="rect">
@@ -4489,7 +4489,7 @@
         </p:nvSpPr>
         <p:spPr>
           <a:xfrm>
-            <a:off x="10485389" y="1096235"/>
+            <a:off x="10576294" y="839060"/>
             <a:ext cx="972526" cy="362145"/>
           </a:xfrm>
           <a:prstGeom prst="roundRect">
@@ -4538,7 +4538,7 @@
         </p:nvCxnSpPr>
         <p:spPr>
           <a:xfrm flipV="1">
-            <a:off x="10284612" y="1458380"/>
+            <a:off x="10375517" y="1201205"/>
             <a:ext cx="687040" cy="143781"/>
           </a:xfrm>
           <a:prstGeom prst="bentConnector2">
@@ -4563,6 +4563,129 @@
           </a:fontRef>
         </p:style>
       </p:cxnSp>
+      <p:pic>
+        <p:nvPicPr>
+          <p:cNvPr id="11" name="Grafik 10">
+            <a:extLst>
+              <a:ext uri="{FF2B5EF4-FFF2-40B4-BE49-F238E27FC236}">
+                <a16:creationId xmlns:a16="http://schemas.microsoft.com/office/drawing/2014/main" id="{C517DFFD-B72F-468A-8388-AD35D61C692C}"/>
+              </a:ext>
+            </a:extLst>
+          </p:cNvPr>
+          <p:cNvPicPr>
+            <a:picLocks noChangeAspect="1"/>
+          </p:cNvPicPr>
+          <p:nvPr/>
+        </p:nvPicPr>
+        <p:blipFill>
+          <a:blip r:embed="rId5">
+            <a:clrChange>
+              <a:clrFrom>
+                <a:srgbClr val="F2F2F2"/>
+              </a:clrFrom>
+              <a:clrTo>
+                <a:srgbClr val="F2F2F2">
+                  <a:alpha val="0"/>
+                </a:srgbClr>
+              </a:clrTo>
+            </a:clrChange>
+          </a:blip>
+          <a:stretch>
+            <a:fillRect/>
+          </a:stretch>
+        </p:blipFill>
+        <p:spPr>
+          <a:xfrm>
+            <a:off x="0" y="2167541"/>
+            <a:ext cx="597705" cy="574715"/>
+          </a:xfrm>
+          <a:prstGeom prst="rect">
+            <a:avLst/>
+          </a:prstGeom>
+        </p:spPr>
+      </p:pic>
+      <p:pic>
+        <p:nvPicPr>
+          <p:cNvPr id="33" name="Grafik 32">
+            <a:extLst>
+              <a:ext uri="{FF2B5EF4-FFF2-40B4-BE49-F238E27FC236}">
+                <a16:creationId xmlns:a16="http://schemas.microsoft.com/office/drawing/2014/main" id="{21850A70-8B09-4A97-B628-6DA27E822EA6}"/>
+              </a:ext>
+            </a:extLst>
+          </p:cNvPr>
+          <p:cNvPicPr>
+            <a:picLocks noChangeAspect="1"/>
+          </p:cNvPicPr>
+          <p:nvPr/>
+        </p:nvPicPr>
+        <p:blipFill>
+          <a:blip r:embed="rId5">
+            <a:clrChange>
+              <a:clrFrom>
+                <a:srgbClr val="F2F2F2"/>
+              </a:clrFrom>
+              <a:clrTo>
+                <a:srgbClr val="F2F2F2">
+                  <a:alpha val="0"/>
+                </a:srgbClr>
+              </a:clrTo>
+            </a:clrChange>
+          </a:blip>
+          <a:stretch>
+            <a:fillRect/>
+          </a:stretch>
+        </p:blipFill>
+        <p:spPr>
+          <a:xfrm>
+            <a:off x="1" y="2930685"/>
+            <a:ext cx="597705" cy="574715"/>
+          </a:xfrm>
+          <a:prstGeom prst="rect">
+            <a:avLst/>
+          </a:prstGeom>
+        </p:spPr>
+      </p:pic>
+      <p:pic>
+        <p:nvPicPr>
+          <p:cNvPr id="34" name="Grafik 33">
+            <a:extLst>
+              <a:ext uri="{FF2B5EF4-FFF2-40B4-BE49-F238E27FC236}">
+                <a16:creationId xmlns:a16="http://schemas.microsoft.com/office/drawing/2014/main" id="{0C2606A4-BB0D-4BF6-9D19-D481C1065CD7}"/>
+              </a:ext>
+            </a:extLst>
+          </p:cNvPr>
+          <p:cNvPicPr>
+            <a:picLocks noChangeAspect="1"/>
+          </p:cNvPicPr>
+          <p:nvPr/>
+        </p:nvPicPr>
+        <p:blipFill>
+          <a:blip r:embed="rId5">
+            <a:clrChange>
+              <a:clrFrom>
+                <a:srgbClr val="F2F2F2"/>
+              </a:clrFrom>
+              <a:clrTo>
+                <a:srgbClr val="F2F2F2">
+                  <a:alpha val="0"/>
+                </a:srgbClr>
+              </a:clrTo>
+            </a:clrChange>
+          </a:blip>
+          <a:stretch>
+            <a:fillRect/>
+          </a:stretch>
+        </p:blipFill>
+        <p:spPr>
+          <a:xfrm>
+            <a:off x="1" y="3677618"/>
+            <a:ext cx="597705" cy="574715"/>
+          </a:xfrm>
+          <a:prstGeom prst="rect">
+            <a:avLst/>
+          </a:prstGeom>
+        </p:spPr>
+      </p:pic>
     </p:spTree>
     <p:extLst>
       <p:ext uri="{BB962C8B-B14F-4D97-AF65-F5344CB8AC3E}">

</xml_diff>